<commit_message>
Move image files and minor updates to presentation
</commit_message>
<xml_diff>
--- a/presentation/ncrm-title-slides.pptx
+++ b/presentation/ncrm-title-slides.pptx
@@ -106,6 +106,11 @@
       </a:defRPr>
     </a:lvl9pPr>
   </p:defaultTextStyle>
+  <p:extLst>
+    <p:ext uri="{EFAFB233-063F-42B5-8137-9DF3F51BA10A}">
+      <p15:sldGuideLst xmlns:p15="http://schemas.microsoft.com/office/powerpoint/2012/main"/>
+    </p:ext>
+  </p:extLst>
 </p:presentation>
 </file>
 
@@ -2813,10 +2818,10 @@
       </p:sp>
       <p:pic>
         <p:nvPicPr>
-          <p:cNvPr id="11" name="Picture 10">
-            <a:extLst>
-              <a:ext uri="{FF2B5EF4-FFF2-40B4-BE49-F238E27FC236}">
-                <a16:creationId xmlns:a16="http://schemas.microsoft.com/office/drawing/2014/main" id="{77384B1B-FB67-3945-8684-91BF0AE0DEC5}"/>
+          <p:cNvPr id="6" name="Picture 5">
+            <a:extLst>
+              <a:ext uri="{FF2B5EF4-FFF2-40B4-BE49-F238E27FC236}">
+                <a16:creationId xmlns:a16="http://schemas.microsoft.com/office/drawing/2014/main" id="{5F0516AC-4CC3-6CDB-F39D-7459E5483F24}"/>
               </a:ext>
             </a:extLst>
           </p:cNvPr>
@@ -2833,8 +2838,8 @@
         </p:blipFill>
         <p:spPr>
           <a:xfrm>
-            <a:off x="363256" y="388314"/>
-            <a:ext cx="5732744" cy="478159"/>
+            <a:off x="363258" y="388314"/>
+            <a:ext cx="5172815" cy="478159"/>
           </a:xfrm>
           <a:prstGeom prst="rect">
             <a:avLst/>
@@ -2843,10 +2848,10 @@
       </p:pic>
       <p:pic>
         <p:nvPicPr>
-          <p:cNvPr id="7" name="Picture 6" descr="R:\CENTRES\NCRM\Publicity\Logos\University of Southampton\university logo copy.jpg">
-            <a:extLst>
-              <a:ext uri="{FF2B5EF4-FFF2-40B4-BE49-F238E27FC236}">
-                <a16:creationId xmlns:a16="http://schemas.microsoft.com/office/drawing/2014/main" id="{D6D25CB6-1CAE-8B46-9C96-79D98998C5BD}"/>
+          <p:cNvPr id="8" name="Picture 7" descr="R:\CENTRES\NCRM\Publicity\Logos\University of Southampton\university logo copy.jpg">
+            <a:extLst>
+              <a:ext uri="{FF2B5EF4-FFF2-40B4-BE49-F238E27FC236}">
+                <a16:creationId xmlns:a16="http://schemas.microsoft.com/office/drawing/2014/main" id="{CB5EE712-FF01-F657-2D7F-FA13D67F94E0}"/>
               </a:ext>
             </a:extLst>
           </p:cNvPr>
@@ -2870,8 +2875,8 @@
         </p:blipFill>
         <p:spPr bwMode="auto">
           <a:xfrm>
-            <a:off x="4292938" y="6297320"/>
-            <a:ext cx="2435812" cy="422298"/>
+            <a:off x="4563960" y="6297320"/>
+            <a:ext cx="1944216" cy="422298"/>
           </a:xfrm>
           <a:prstGeom prst="rect">
             <a:avLst/>
@@ -2890,10 +2895,10 @@
       </p:pic>
       <p:pic>
         <p:nvPicPr>
-          <p:cNvPr id="9" name="Picture 7" descr="R:\CENTRES\NCRM\Publicity\Logos\Other\TAB_col_white_background.png">
-            <a:extLst>
-              <a:ext uri="{FF2B5EF4-FFF2-40B4-BE49-F238E27FC236}">
-                <a16:creationId xmlns:a16="http://schemas.microsoft.com/office/drawing/2014/main" id="{81AE495C-B492-4C4D-9AF6-92DDCC336583}"/>
+          <p:cNvPr id="12" name="Picture 7" descr="R:\CENTRES\NCRM\Publicity\Logos\Other\TAB_col_white_background.png">
+            <a:extLst>
+              <a:ext uri="{FF2B5EF4-FFF2-40B4-BE49-F238E27FC236}">
+                <a16:creationId xmlns:a16="http://schemas.microsoft.com/office/drawing/2014/main" id="{501CAF5F-FFC7-E8A7-3240-C019C5BC3933}"/>
               </a:ext>
             </a:extLst>
           </p:cNvPr>
@@ -2918,7 +2923,7 @@
         <p:spPr bwMode="auto">
           <a:xfrm>
             <a:off x="7344480" y="6249440"/>
-            <a:ext cx="1606608" cy="500833"/>
+            <a:ext cx="1181829" cy="500833"/>
           </a:xfrm>
           <a:prstGeom prst="rect">
             <a:avLst/>
@@ -2937,10 +2942,10 @@
       </p:pic>
       <p:pic>
         <p:nvPicPr>
-          <p:cNvPr id="10" name="Picture 8" descr="R:\CENTRES\NCRM\Publicity\Logos\Other\298px-University_of_Edinburgh_logo.svg.png">
-            <a:extLst>
-              <a:ext uri="{FF2B5EF4-FFF2-40B4-BE49-F238E27FC236}">
-                <a16:creationId xmlns:a16="http://schemas.microsoft.com/office/drawing/2014/main" id="{E6688575-48E5-7B4A-B014-D341528E139C}"/>
+          <p:cNvPr id="13" name="Picture 8" descr="R:\CENTRES\NCRM\Publicity\Logos\Other\298px-University_of_Edinburgh_logo.svg.png">
+            <a:extLst>
+              <a:ext uri="{FF2B5EF4-FFF2-40B4-BE49-F238E27FC236}">
+                <a16:creationId xmlns:a16="http://schemas.microsoft.com/office/drawing/2014/main" id="{553A9870-9CF7-8B6F-F968-6655A759808B}"/>
               </a:ext>
             </a:extLst>
           </p:cNvPr>
@@ -2964,8 +2969,8 @@
         </p:blipFill>
         <p:spPr bwMode="auto">
           <a:xfrm>
-            <a:off x="9748429" y="6232388"/>
-            <a:ext cx="745951" cy="507438"/>
+            <a:off x="9362607" y="6224270"/>
+            <a:ext cx="504056" cy="507438"/>
           </a:xfrm>
           <a:prstGeom prst="rect">
             <a:avLst/>
@@ -2984,10 +2989,10 @@
       </p:pic>
       <p:pic>
         <p:nvPicPr>
-          <p:cNvPr id="5" name="Picture 4" descr="A picture containing drawing&#10;&#10;Description automatically generated">
-            <a:extLst>
-              <a:ext uri="{FF2B5EF4-FFF2-40B4-BE49-F238E27FC236}">
-                <a16:creationId xmlns:a16="http://schemas.microsoft.com/office/drawing/2014/main" id="{7F18DE1A-82E0-6541-9A23-838A0F31412E}"/>
+          <p:cNvPr id="14" name="Picture 13" descr="A picture containing drawing&#10;&#10;Description automatically generated">
+            <a:extLst>
+              <a:ext uri="{FF2B5EF4-FFF2-40B4-BE49-F238E27FC236}">
+                <a16:creationId xmlns:a16="http://schemas.microsoft.com/office/drawing/2014/main" id="{91C69C9C-A237-F7F8-B1A1-EEF9C7CCC572}"/>
               </a:ext>
             </a:extLst>
           </p:cNvPr>
@@ -3004,8 +3009,8 @@
         </p:blipFill>
         <p:spPr>
           <a:xfrm>
-            <a:off x="1512426" y="6252596"/>
-            <a:ext cx="2215239" cy="467022"/>
+            <a:off x="1874642" y="6252596"/>
+            <a:ext cx="1853023" cy="467022"/>
           </a:xfrm>
           <a:prstGeom prst="rect">
             <a:avLst/>
@@ -6206,9 +6211,10 @@
           <a:lstStyle/>
           <a:p>
             <a:r>
-              <a:rPr lang="en-GB" sz="3000" dirty="0"/>
+              <a:rPr lang="en-GB" sz="3000"/>
               <a:t>comprehensive training in research methods</a:t>
             </a:r>
+            <a:endParaRPr lang="en-GB" sz="3000" dirty="0"/>
           </a:p>
         </p:txBody>
       </p:sp>
@@ -6241,9 +6247,10 @@
           <a:lstStyle/>
           <a:p>
             <a:r>
-              <a:rPr lang="en-GB" sz="2400" dirty="0"/>
+              <a:rPr lang="en-GB" sz="2400"/>
               <a:t>www.ncrm.ac.uk</a:t>
             </a:r>
+            <a:endParaRPr lang="en-GB" sz="2400" dirty="0"/>
           </a:p>
         </p:txBody>
       </p:sp>
@@ -6326,7 +6333,7 @@
                 <a:ea typeface="+mj-ea"/>
                 <a:cs typeface="+mj-cs"/>
               </a:rPr>
-              <a:t>Introduction to QGIS: </a:t>
+              <a:t>Introduction to Spatial Data &amp; </a:t>
             </a:r>
             <a:br>
               <a:rPr kumimoji="0" lang="en-US" sz="3600" b="1" i="0" u="none" strike="noStrike" kern="1200" cap="none" spc="-1" normalizeH="0" baseline="0" noProof="0" dirty="0">
@@ -6359,7 +6366,7 @@
                 <a:ea typeface="+mj-ea"/>
                 <a:cs typeface="+mj-cs"/>
               </a:rPr>
-              <a:t>Spatial Data and Spatial Analysis</a:t>
+              <a:t>Using R as a GIS</a:t>
             </a:r>
             <a:endParaRPr kumimoji="0" lang="en-GB" sz="2800" b="1" i="0" u="none" strike="noStrike" kern="1200" cap="none" spc="-1" normalizeH="0" baseline="0" noProof="0" dirty="0">
               <a:ln>
@@ -6675,7 +6682,7 @@
                 <a:ea typeface="+mn-ea"/>
                 <a:cs typeface="+mn-cs"/>
               </a:rPr>
-              <a:t>27</a:t>
+              <a:t>Tue 25</a:t>
             </a:r>
             <a:r>
               <a:rPr kumimoji="0" lang="en-GB" sz="2400" b="0" i="0" u="none" strike="noStrike" kern="1200" cap="none" spc="-1" normalizeH="0" baseline="30000" noProof="0" dirty="0">
@@ -6709,7 +6716,7 @@
                 <a:ea typeface="+mn-ea"/>
                 <a:cs typeface="+mn-cs"/>
               </a:rPr>
-              <a:t>, 28</a:t>
+              <a:t> and Wed 26</a:t>
             </a:r>
             <a:r>
               <a:rPr kumimoji="0" lang="en-GB" sz="2400" b="0" i="0" u="none" strike="noStrike" kern="1200" cap="none" spc="-1" normalizeH="0" baseline="30000" noProof="0" dirty="0">
@@ -6729,32 +6736,6 @@
               <a:t>th</a:t>
             </a:r>
             <a:r>
-              <a:rPr lang="en-GB" sz="2400" spc="-1" dirty="0">
-                <a:solidFill>
-                  <a:srgbClr val="F2F2F2"/>
-                </a:solidFill>
-                <a:latin typeface="Calibri"/>
-              </a:rPr>
-              <a:t> Feb a</a:t>
-            </a:r>
-            <a:r>
-              <a:rPr kumimoji="0" lang="en-GB" sz="2400" b="0" i="0" u="none" strike="noStrike" kern="1200" cap="none" spc="-1" normalizeH="0" baseline="0" noProof="0" dirty="0" err="1">
-                <a:ln>
-                  <a:noFill/>
-                </a:ln>
-                <a:solidFill>
-                  <a:srgbClr val="F2F2F2"/>
-                </a:solidFill>
-                <a:effectLst/>
-                <a:uLnTx/>
-                <a:uFillTx/>
-                <a:latin typeface="Calibri"/>
-                <a:ea typeface="+mn-ea"/>
-                <a:cs typeface="+mn-cs"/>
-              </a:rPr>
-              <a:t>nd</a:t>
-            </a:r>
-            <a:r>
               <a:rPr kumimoji="0" lang="en-GB" sz="2400" b="0" i="0" u="none" strike="noStrike" kern="1200" cap="none" spc="-1" normalizeH="0" baseline="0" noProof="0" dirty="0">
                 <a:ln>
                   <a:noFill/>
@@ -6769,84 +6750,7 @@
                 <a:ea typeface="+mn-ea"/>
                 <a:cs typeface="+mn-cs"/>
               </a:rPr>
-              <a:t> 4</a:t>
-            </a:r>
-            <a:r>
-              <a:rPr kumimoji="0" lang="en-GB" sz="2400" b="0" i="0" u="none" strike="noStrike" kern="1200" cap="none" spc="-1" normalizeH="0" baseline="30000" noProof="0" dirty="0">
-                <a:ln>
-                  <a:noFill/>
-                </a:ln>
-                <a:solidFill>
-                  <a:srgbClr val="F2F2F2"/>
-                </a:solidFill>
-                <a:effectLst/>
-                <a:uLnTx/>
-                <a:uFillTx/>
-                <a:latin typeface="Calibri"/>
-                <a:ea typeface="+mn-ea"/>
-                <a:cs typeface="+mn-cs"/>
-              </a:rPr>
-              <a:t>th</a:t>
-            </a:r>
-            <a:r>
-              <a:rPr kumimoji="0" lang="en-GB" sz="2400" b="0" i="0" u="none" strike="noStrike" kern="1200" cap="none" spc="-1" normalizeH="0" baseline="0" noProof="0" dirty="0">
-                <a:ln>
-                  <a:noFill/>
-                </a:ln>
-                <a:solidFill>
-                  <a:srgbClr val="F2F2F2"/>
-                </a:solidFill>
-                <a:effectLst/>
-                <a:uLnTx/>
-                <a:uFillTx/>
-                <a:latin typeface="Calibri"/>
-                <a:ea typeface="+mn-ea"/>
-                <a:cs typeface="+mn-cs"/>
-              </a:rPr>
-              <a:t> , 5</a:t>
-            </a:r>
-            <a:r>
-              <a:rPr kumimoji="0" lang="en-GB" sz="2400" b="0" i="0" u="none" strike="noStrike" kern="1200" cap="none" spc="-1" normalizeH="0" baseline="30000" noProof="0" dirty="0">
-                <a:ln>
-                  <a:noFill/>
-                </a:ln>
-                <a:solidFill>
-                  <a:srgbClr val="F2F2F2"/>
-                </a:solidFill>
-                <a:effectLst/>
-                <a:uLnTx/>
-                <a:uFillTx/>
-                <a:latin typeface="Calibri"/>
-                <a:ea typeface="+mn-ea"/>
-                <a:cs typeface="+mn-cs"/>
-              </a:rPr>
-              <a:t>th</a:t>
-            </a:r>
-            <a:r>
-              <a:rPr kumimoji="0" lang="en-GB" sz="2400" b="0" i="0" u="none" strike="noStrike" kern="1200" cap="none" spc="-1" normalizeH="0" baseline="0" noProof="0" dirty="0">
-                <a:ln>
-                  <a:noFill/>
-                </a:ln>
-                <a:solidFill>
-                  <a:srgbClr val="F2F2F2"/>
-                </a:solidFill>
-                <a:effectLst/>
-                <a:uLnTx/>
-                <a:uFillTx/>
-                <a:latin typeface="Calibri"/>
-                <a:ea typeface="+mn-ea"/>
-                <a:cs typeface="+mn-cs"/>
-              </a:rPr>
-              <a:t> March 202</a:t>
-            </a:r>
-            <a:r>
-              <a:rPr lang="en-GB" sz="2400" spc="-1" dirty="0">
-                <a:solidFill>
-                  <a:srgbClr val="F2F2F2"/>
-                </a:solidFill>
-                <a:latin typeface="Calibri"/>
-              </a:rPr>
-              <a:t>4</a:t>
+              <a:t> June 2024</a:t>
             </a:r>
             <a:endParaRPr kumimoji="0" lang="en-GB" sz="2400" b="0" i="0" u="none" strike="noStrike" kern="1200" cap="none" spc="-1" normalizeH="0" baseline="0" noProof="0" dirty="0">
               <a:ln>
@@ -6943,7 +6847,7 @@
         </p:blipFill>
         <p:spPr>
           <a:xfrm>
-            <a:off x="9279794" y="87776"/>
+            <a:off x="10789279" y="131319"/>
             <a:ext cx="1221787" cy="1091437"/>
           </a:xfrm>
           <a:prstGeom prst="rect">

</xml_diff>

<commit_message>
Updates for next course
</commit_message>
<xml_diff>
--- a/presentation/ncrm-title-slides.pptx
+++ b/presentation/ncrm-title-slides.pptx
@@ -6682,7 +6682,7 @@
                 <a:ea typeface="+mn-ea"/>
                 <a:cs typeface="+mn-cs"/>
               </a:rPr>
-              <a:t>Tue 25</a:t>
+              <a:t>Tue 27</a:t>
             </a:r>
             <a:r>
               <a:rPr kumimoji="0" lang="en-GB" sz="2400" b="0" i="0" u="none" strike="noStrike" kern="1200" cap="none" spc="-1" normalizeH="0" baseline="30000" noProof="0" dirty="0">
@@ -6716,10 +6716,27 @@
                 <a:ea typeface="+mn-ea"/>
                 <a:cs typeface="+mn-cs"/>
               </a:rPr>
-              <a:t> and Wed 26</a:t>
-            </a:r>
-            <a:r>
-              <a:rPr kumimoji="0" lang="en-GB" sz="2400" b="0" i="0" u="none" strike="noStrike" kern="1200" cap="none" spc="-1" normalizeH="0" baseline="30000" noProof="0" dirty="0">
+              <a:t> and Wed </a:t>
+            </a:r>
+            <a:r>
+              <a:rPr kumimoji="0" lang="en-GB" sz="2400" b="0" i="0" u="none" strike="noStrike" kern="1200" cap="none" spc="-1" normalizeH="0" baseline="0" noProof="0">
+                <a:ln>
+                  <a:noFill/>
+                </a:ln>
+                <a:solidFill>
+                  <a:srgbClr val="F2F2F2"/>
+                </a:solidFill>
+                <a:effectLst/>
+                <a:uLnTx/>
+                <a:uFillTx/>
+                <a:latin typeface="Calibri"/>
+                <a:ea typeface="+mn-ea"/>
+                <a:cs typeface="+mn-cs"/>
+              </a:rPr>
+              <a:t>28</a:t>
+            </a:r>
+            <a:r>
+              <a:rPr kumimoji="0" lang="en-GB" sz="2400" b="0" i="0" u="none" strike="noStrike" kern="1200" cap="none" spc="-1" normalizeH="0" baseline="30000" noProof="0">
                 <a:ln>
                   <a:noFill/>
                 </a:ln>
@@ -6736,7 +6753,7 @@
               <a:t>th</a:t>
             </a:r>
             <a:r>
-              <a:rPr kumimoji="0" lang="en-GB" sz="2400" b="0" i="0" u="none" strike="noStrike" kern="1200" cap="none" spc="-1" normalizeH="0" baseline="0" noProof="0" dirty="0">
+              <a:rPr kumimoji="0" lang="en-GB" sz="2400" b="0" i="0" u="none" strike="noStrike" kern="1200" cap="none" spc="-1" normalizeH="0" baseline="0" noProof="0">
                 <a:ln>
                   <a:noFill/>
                 </a:ln>
@@ -6750,7 +6767,7 @@
                 <a:ea typeface="+mn-ea"/>
                 <a:cs typeface="+mn-cs"/>
               </a:rPr>
-              <a:t> June 2024</a:t>
+              <a:t> May 2025</a:t>
             </a:r>
             <a:endParaRPr kumimoji="0" lang="en-GB" sz="2400" b="0" i="0" u="none" strike="noStrike" kern="1200" cap="none" spc="-1" normalizeH="0" baseline="0" noProof="0" dirty="0">
               <a:ln>

</xml_diff>